<commit_message>
Update 00.a - Professor  Introduction.pptx
</commit_message>
<xml_diff>
--- a/Common Intro/00.a - Professor  Introduction.pptx
+++ b/Common Intro/00.a - Professor  Introduction.pptx
@@ -315,7 +315,7 @@
             <a:fld id="{1D8BD707-D9CF-40AE-B4C6-C98DA3205C09}" type="datetimeFigureOut">
               <a:rPr lang="en-US" smtClean="0"/>
               <a:pPr/>
-              <a:t>8/25/2018</a:t>
+              <a:t>1/17/2021</a:t>
             </a:fld>
             <a:endParaRPr lang="en-US"/>
           </a:p>
@@ -471,7 +471,7 @@
             <a:fld id="{1D8BD707-D9CF-40AE-B4C6-C98DA3205C09}" type="datetimeFigureOut">
               <a:rPr lang="en-US" smtClean="0"/>
               <a:pPr/>
-              <a:t>8/25/2018</a:t>
+              <a:t>1/17/2021</a:t>
             </a:fld>
             <a:endParaRPr lang="en-US"/>
           </a:p>
@@ -745,7 +745,7 @@
             <a:fld id="{1D8BD707-D9CF-40AE-B4C6-C98DA3205C09}" type="datetimeFigureOut">
               <a:rPr lang="en-US" smtClean="0"/>
               <a:pPr/>
-              <a:t>8/25/2018</a:t>
+              <a:t>1/17/2021</a:t>
             </a:fld>
             <a:endParaRPr lang="en-US"/>
           </a:p>
@@ -1153,7 +1153,7 @@
             <a:fld id="{1D8BD707-D9CF-40AE-B4C6-C98DA3205C09}" type="datetimeFigureOut">
               <a:rPr lang="en-US" smtClean="0"/>
               <a:pPr/>
-              <a:t>8/25/2018</a:t>
+              <a:t>1/17/2021</a:t>
             </a:fld>
             <a:endParaRPr lang="en-US"/>
           </a:p>
@@ -1257,7 +1257,7 @@
             <a:fld id="{1D8BD707-D9CF-40AE-B4C6-C98DA3205C09}" type="datetimeFigureOut">
               <a:rPr lang="en-US" smtClean="0"/>
               <a:pPr/>
-              <a:t>8/25/2018</a:t>
+              <a:t>1/17/2021</a:t>
             </a:fld>
             <a:endParaRPr lang="en-US"/>
           </a:p>
@@ -1338,7 +1338,7 @@
             <a:fld id="{1D8BD707-D9CF-40AE-B4C6-C98DA3205C09}" type="datetimeFigureOut">
               <a:rPr lang="en-US" smtClean="0"/>
               <a:pPr/>
-              <a:t>8/25/2018</a:t>
+              <a:t>1/17/2021</a:t>
             </a:fld>
             <a:endParaRPr lang="en-US"/>
           </a:p>
@@ -1591,7 +1591,7 @@
             <a:fld id="{1D8BD707-D9CF-40AE-B4C6-C98DA3205C09}" type="datetimeFigureOut">
               <a:rPr lang="en-US" smtClean="0"/>
               <a:pPr/>
-              <a:t>8/25/2018</a:t>
+              <a:t>1/17/2021</a:t>
             </a:fld>
             <a:endParaRPr lang="en-US"/>
           </a:p>
@@ -2662,56 +2662,24 @@
           </a:p>
           <a:p>
             <a:r>
-              <a:rPr lang="en-US" sz="2800" dirty="0"/>
-              <a:t>7</a:t>
-            </a:r>
-            <a:r>
-              <a:rPr lang="en-US" sz="2800" smtClean="0"/>
-              <a:t> </a:t>
-            </a:r>
-            <a:r>
               <a:rPr lang="en-US" sz="2800" dirty="0" smtClean="0"/>
-              <a:t>years teaching at</a:t>
-            </a:r>
+              <a:t>Started at </a:t>
+            </a:r>
+            <a:r>
+              <a:rPr lang="en-US" sz="2800" dirty="0" err="1" smtClean="0"/>
+              <a:t>Ursinus</a:t>
+            </a:r>
+            <a:r>
+              <a:rPr lang="en-US" sz="2800" dirty="0" smtClean="0"/>
+              <a:t> in 2011</a:t>
+            </a:r>
+            <a:endParaRPr lang="en-US" sz="2800" dirty="0" smtClean="0"/>
           </a:p>
           <a:p>
             <a:endParaRPr lang="en-US" dirty="0"/>
           </a:p>
         </p:txBody>
       </p:sp>
-      <p:cxnSp>
-        <p:nvCxnSpPr>
-          <p:cNvPr id="7" name="Straight Arrow Connector 6"/>
-          <p:cNvCxnSpPr/>
-          <p:nvPr/>
-        </p:nvCxnSpPr>
-        <p:spPr>
-          <a:xfrm>
-            <a:off x="4648200" y="5638800"/>
-            <a:ext cx="1219200" cy="800725"/>
-          </a:xfrm>
-          <a:prstGeom prst="straightConnector1">
-            <a:avLst/>
-          </a:prstGeom>
-          <a:ln>
-            <a:tailEnd type="arrow"/>
-          </a:ln>
-        </p:spPr>
-        <p:style>
-          <a:lnRef idx="3">
-            <a:schemeClr val="accent1"/>
-          </a:lnRef>
-          <a:fillRef idx="0">
-            <a:schemeClr val="accent1"/>
-          </a:fillRef>
-          <a:effectRef idx="2">
-            <a:schemeClr val="accent1"/>
-          </a:effectRef>
-          <a:fontRef idx="minor">
-            <a:schemeClr val="tx1"/>
-          </a:fontRef>
-        </p:style>
-      </p:cxnSp>
     </p:spTree>
     <p:extLst>
       <p:ext uri="{BB962C8B-B14F-4D97-AF65-F5344CB8AC3E}">

</xml_diff>